<commit_message>
imostly finished up to task 9
</commit_message>
<xml_diff>
--- a/earth_diagram_lol.pptx
+++ b/earth_diagram_lol.pptx
@@ -304,7 +304,7 @@
           <a:p>
             <a:fld id="{0460A97C-6094-44F3-9AD2-0A11796E8BE7}" type="datetimeFigureOut">
               <a:rPr lang="en-US" smtClean="0"/>
-              <a:t>3/5/2019</a:t>
+              <a:t>3/8/2019</a:t>
             </a:fld>
             <a:endParaRPr lang="en-GB"/>
           </a:p>
@@ -469,7 +469,7 @@
           <a:p>
             <a:fld id="{0460A97C-6094-44F3-9AD2-0A11796E8BE7}" type="datetimeFigureOut">
               <a:rPr lang="en-US" smtClean="0"/>
-              <a:t>3/5/2019</a:t>
+              <a:t>3/8/2019</a:t>
             </a:fld>
             <a:endParaRPr lang="en-GB"/>
           </a:p>
@@ -644,7 +644,7 @@
           <a:p>
             <a:fld id="{0460A97C-6094-44F3-9AD2-0A11796E8BE7}" type="datetimeFigureOut">
               <a:rPr lang="en-US" smtClean="0"/>
-              <a:t>3/5/2019</a:t>
+              <a:t>3/8/2019</a:t>
             </a:fld>
             <a:endParaRPr lang="en-GB"/>
           </a:p>
@@ -809,7 +809,7 @@
           <a:p>
             <a:fld id="{0460A97C-6094-44F3-9AD2-0A11796E8BE7}" type="datetimeFigureOut">
               <a:rPr lang="en-US" smtClean="0"/>
-              <a:t>3/5/2019</a:t>
+              <a:t>3/8/2019</a:t>
             </a:fld>
             <a:endParaRPr lang="en-GB"/>
           </a:p>
@@ -1050,7 +1050,7 @@
           <a:p>
             <a:fld id="{0460A97C-6094-44F3-9AD2-0A11796E8BE7}" type="datetimeFigureOut">
               <a:rPr lang="en-US" smtClean="0"/>
-              <a:t>3/5/2019</a:t>
+              <a:t>3/8/2019</a:t>
             </a:fld>
             <a:endParaRPr lang="en-GB"/>
           </a:p>
@@ -1333,7 +1333,7 @@
           <a:p>
             <a:fld id="{0460A97C-6094-44F3-9AD2-0A11796E8BE7}" type="datetimeFigureOut">
               <a:rPr lang="en-US" smtClean="0"/>
-              <a:t>3/5/2019</a:t>
+              <a:t>3/8/2019</a:t>
             </a:fld>
             <a:endParaRPr lang="en-GB"/>
           </a:p>
@@ -1750,7 +1750,7 @@
           <a:p>
             <a:fld id="{0460A97C-6094-44F3-9AD2-0A11796E8BE7}" type="datetimeFigureOut">
               <a:rPr lang="en-US" smtClean="0"/>
-              <a:t>3/5/2019</a:t>
+              <a:t>3/8/2019</a:t>
             </a:fld>
             <a:endParaRPr lang="en-GB"/>
           </a:p>
@@ -1863,7 +1863,7 @@
           <a:p>
             <a:fld id="{0460A97C-6094-44F3-9AD2-0A11796E8BE7}" type="datetimeFigureOut">
               <a:rPr lang="en-US" smtClean="0"/>
-              <a:t>3/5/2019</a:t>
+              <a:t>3/8/2019</a:t>
             </a:fld>
             <a:endParaRPr lang="en-GB"/>
           </a:p>
@@ -1953,7 +1953,7 @@
           <a:p>
             <a:fld id="{0460A97C-6094-44F3-9AD2-0A11796E8BE7}" type="datetimeFigureOut">
               <a:rPr lang="en-US" smtClean="0"/>
-              <a:t>3/5/2019</a:t>
+              <a:t>3/8/2019</a:t>
             </a:fld>
             <a:endParaRPr lang="en-GB"/>
           </a:p>
@@ -2225,7 +2225,7 @@
           <a:p>
             <a:fld id="{0460A97C-6094-44F3-9AD2-0A11796E8BE7}" type="datetimeFigureOut">
               <a:rPr lang="en-US" smtClean="0"/>
-              <a:t>3/5/2019</a:t>
+              <a:t>3/8/2019</a:t>
             </a:fld>
             <a:endParaRPr lang="en-GB"/>
           </a:p>
@@ -2477,7 +2477,7 @@
           <a:p>
             <a:fld id="{0460A97C-6094-44F3-9AD2-0A11796E8BE7}" type="datetimeFigureOut">
               <a:rPr lang="en-US" smtClean="0"/>
-              <a:t>3/5/2019</a:t>
+              <a:t>3/8/2019</a:t>
             </a:fld>
             <a:endParaRPr lang="en-GB"/>
           </a:p>
@@ -2685,7 +2685,7 @@
           <a:p>
             <a:fld id="{0460A97C-6094-44F3-9AD2-0A11796E8BE7}" type="datetimeFigureOut">
               <a:rPr lang="en-US" smtClean="0"/>
-              <a:t>3/5/2019</a:t>
+              <a:t>3/8/2019</a:t>
             </a:fld>
             <a:endParaRPr lang="en-GB"/>
           </a:p>
@@ -3062,17 +3062,15 @@
           <p:nvPr/>
         </p:nvSpPr>
         <p:spPr>
-          <a:xfrm>
-            <a:off x="107504" y="116632"/>
-            <a:ext cx="6624736" cy="6624736"/>
+          <a:xfrm flipV="1">
+            <a:off x="70316" y="79444"/>
+            <a:ext cx="6699112" cy="6699112"/>
           </a:xfrm>
           <a:prstGeom prst="ellipse">
             <a:avLst/>
           </a:prstGeom>
           <a:solidFill>
-            <a:schemeClr val="accent6">
-              <a:lumMod val="50000"/>
-            </a:schemeClr>
+            <a:srgbClr val="996633"/>
           </a:solidFill>
           <a:ln w="3175">
             <a:solidFill>
@@ -3112,9 +3110,9 @@
           <p:nvPr/>
         </p:nvSpPr>
         <p:spPr>
-          <a:xfrm>
-            <a:off x="187896" y="197024"/>
-            <a:ext cx="6472336" cy="6472336"/>
+          <a:xfrm flipV="1">
+            <a:off x="95776" y="104904"/>
+            <a:ext cx="6656576" cy="6656576"/>
           </a:xfrm>
           <a:prstGeom prst="ellipse">
             <a:avLst/>
@@ -3164,8 +3162,8 @@
         </p:nvSpPr>
         <p:spPr>
           <a:xfrm>
-            <a:off x="399728" y="413048"/>
-            <a:ext cx="6040288" cy="6040288"/>
+            <a:off x="298377" y="311697"/>
+            <a:ext cx="6242990" cy="6242990"/>
           </a:xfrm>
           <a:prstGeom prst="ellipse">
             <a:avLst/>
@@ -3214,9 +3212,9 @@
           <p:nvPr/>
         </p:nvSpPr>
         <p:spPr>
-          <a:xfrm>
-            <a:off x="539552" y="552872"/>
-            <a:ext cx="5760640" cy="5760640"/>
+          <a:xfrm flipV="1">
+            <a:off x="492357" y="505677"/>
+            <a:ext cx="5855030" cy="5855030"/>
           </a:xfrm>
           <a:prstGeom prst="ellipse">
             <a:avLst/>
@@ -3263,7 +3261,7 @@
         </p:nvSpPr>
         <p:spPr>
           <a:xfrm>
-            <a:off x="3284241" y="1700808"/>
+            <a:off x="4029303" y="2348880"/>
             <a:ext cx="1359767" cy="1359767"/>
           </a:xfrm>
           <a:prstGeom prst="ellipse">
@@ -3311,7 +3309,7 @@
         </p:nvSpPr>
         <p:spPr>
           <a:xfrm>
-            <a:off x="3203848" y="1789584"/>
+            <a:off x="3525240" y="2452246"/>
             <a:ext cx="1999456" cy="1999456"/>
           </a:xfrm>
           <a:prstGeom prst="ellipse">
@@ -3359,8 +3357,8 @@
         </p:nvSpPr>
         <p:spPr>
           <a:xfrm>
-            <a:off x="1835696" y="1849016"/>
-            <a:ext cx="3168352" cy="3168352"/>
+            <a:off x="1547664" y="1560984"/>
+            <a:ext cx="3744416" cy="3744416"/>
           </a:xfrm>
           <a:prstGeom prst="ellipse">
             <a:avLst/>
@@ -3409,8 +3407,8 @@
         </p:nvSpPr>
         <p:spPr>
           <a:xfrm>
-            <a:off x="2407568" y="2420888"/>
-            <a:ext cx="2024608" cy="2024608"/>
+            <a:off x="2771800" y="2785120"/>
+            <a:ext cx="1296144" cy="1296144"/>
           </a:xfrm>
           <a:prstGeom prst="ellipse">
             <a:avLst/>
@@ -3459,7 +3457,7 @@
         </p:nvSpPr>
         <p:spPr>
           <a:xfrm>
-            <a:off x="6817881" y="197024"/>
+            <a:off x="6754801" y="3244334"/>
             <a:ext cx="1486214" cy="369332"/>
           </a:xfrm>
           <a:prstGeom prst="rect">
@@ -3476,13 +3474,16 @@
             <a:r>
               <a:rPr lang="en-GB" dirty="0" smtClean="0">
                 <a:solidFill>
-                  <a:schemeClr val="accent6">
-                    <a:lumMod val="50000"/>
-                  </a:schemeClr>
+                  <a:srgbClr val="996633"/>
                 </a:solidFill>
               </a:rPr>
-              <a:t>Lithosphere</a:t>
-            </a:r>
+              <a:t>Crust</a:t>
+            </a:r>
+            <a:endParaRPr lang="en-GB" dirty="0" smtClean="0">
+              <a:solidFill>
+                <a:srgbClr val="996633"/>
+              </a:solidFill>
+            </a:endParaRPr>
           </a:p>
         </p:txBody>
       </p:sp>
@@ -3494,7 +3495,7 @@
         </p:nvSpPr>
         <p:spPr>
           <a:xfrm>
-            <a:off x="6817881" y="511768"/>
+            <a:off x="6754801" y="3559078"/>
             <a:ext cx="1531651" cy="369332"/>
           </a:xfrm>
           <a:prstGeom prst="rect">
@@ -3538,7 +3539,7 @@
         </p:nvSpPr>
         <p:spPr>
           <a:xfrm>
-            <a:off x="6817881" y="800058"/>
+            <a:off x="6754801" y="3847368"/>
             <a:ext cx="1656184" cy="369332"/>
           </a:xfrm>
           <a:prstGeom prst="rect">
@@ -3582,7 +3583,7 @@
         </p:nvSpPr>
         <p:spPr>
           <a:xfrm>
-            <a:off x="6817881" y="1109726"/>
+            <a:off x="6754801" y="4157036"/>
             <a:ext cx="1521990" cy="369332"/>
           </a:xfrm>
           <a:prstGeom prst="rect">
@@ -3620,7 +3621,7 @@
         </p:nvSpPr>
         <p:spPr>
           <a:xfrm>
-            <a:off x="6814865" y="1412776"/>
+            <a:off x="6751785" y="4460086"/>
             <a:ext cx="757984" cy="369332"/>
           </a:xfrm>
           <a:prstGeom prst="rect">
@@ -3658,7 +3659,7 @@
         </p:nvSpPr>
         <p:spPr>
           <a:xfrm>
-            <a:off x="6809531" y="1700808"/>
+            <a:off x="6746451" y="4748118"/>
             <a:ext cx="673088" cy="369332"/>
           </a:xfrm>
           <a:prstGeom prst="rect">
@@ -3696,7 +3697,7 @@
         </p:nvSpPr>
         <p:spPr>
           <a:xfrm>
-            <a:off x="6809531" y="1979548"/>
+            <a:off x="6746451" y="5026858"/>
             <a:ext cx="1643487" cy="369332"/>
           </a:xfrm>
           <a:prstGeom prst="rect">
@@ -3738,7 +3739,7 @@
         </p:nvSpPr>
         <p:spPr>
           <a:xfrm>
-            <a:off x="6809531" y="2267580"/>
+            <a:off x="6746451" y="5314890"/>
             <a:ext cx="1181343" cy="369332"/>
           </a:xfrm>
           <a:prstGeom prst="rect">

</xml_diff>